<commit_message>
update player decision flowchart in slides
</commit_message>
<xml_diff>
--- a/presentation/introduction.pptx
+++ b/presentation/introduction.pptx
@@ -3370,7 +3370,7 @@
               <a:pPr>
                 <a:defRPr/>
               </a:pPr>
-              <a:t>11/08/2019</a:t>
+              <a:t>13/08/2019</a:t>
             </a:fld>
             <a:endParaRPr lang="en-GB"/>
           </a:p>
@@ -3589,7 +3589,7 @@
               <a:pPr>
                 <a:defRPr/>
               </a:pPr>
-              <a:t>11/08/2019</a:t>
+              <a:t>13/08/2019</a:t>
             </a:fld>
             <a:endParaRPr lang="en-GB"/>
           </a:p>
@@ -12738,35 +12738,6 @@
           <a:chExt cx="0" cy="0"/>
         </a:xfrm>
       </p:grpSpPr>
-      <p:pic>
-        <p:nvPicPr>
-          <p:cNvPr id="9" name="Content Placeholder 8">
-            <a:extLst>
-              <a:ext uri="{FF2B5EF4-FFF2-40B4-BE49-F238E27FC236}">
-                <a16:creationId xmlns:a16="http://schemas.microsoft.com/office/drawing/2014/main" id="{4F1C1284-322E-A546-BBEF-3E031BE140B6}"/>
-              </a:ext>
-            </a:extLst>
-          </p:cNvPr>
-          <p:cNvPicPr>
-            <a:picLocks noGrp="1" noChangeAspect="1"/>
-          </p:cNvPicPr>
-          <p:nvPr>
-            <p:ph idx="1"/>
-          </p:nvPr>
-        </p:nvPicPr>
-        <p:blipFill>
-          <a:blip r:embed="rId2"/>
-          <a:stretch>
-            <a:fillRect/>
-          </a:stretch>
-        </p:blipFill>
-        <p:spPr>
-          <a:xfrm>
-            <a:off x="319088" y="3456534"/>
-            <a:ext cx="8509000" cy="2046781"/>
-          </a:xfrm>
-        </p:spPr>
-      </p:pic>
       <p:sp>
         <p:nvSpPr>
           <p:cNvPr id="3" name="Slide Number Placeholder 2">
@@ -12890,6 +12861,35 @@
           </a:p>
         </p:txBody>
       </p:sp>
+      <p:pic>
+        <p:nvPicPr>
+          <p:cNvPr id="14" name="Content Placeholder 13">
+            <a:extLst>
+              <a:ext uri="{FF2B5EF4-FFF2-40B4-BE49-F238E27FC236}">
+                <a16:creationId xmlns:a16="http://schemas.microsoft.com/office/drawing/2014/main" id="{C4522A1A-6992-8549-B055-EF73C484E402}"/>
+              </a:ext>
+            </a:extLst>
+          </p:cNvPr>
+          <p:cNvPicPr>
+            <a:picLocks noGrp="1" noChangeAspect="1"/>
+          </p:cNvPicPr>
+          <p:nvPr>
+            <p:ph idx="1"/>
+          </p:nvPr>
+        </p:nvPicPr>
+        <p:blipFill>
+          <a:blip r:embed="rId2"/>
+          <a:stretch>
+            <a:fillRect/>
+          </a:stretch>
+        </p:blipFill>
+        <p:spPr>
+          <a:xfrm>
+            <a:off x="319088" y="3378599"/>
+            <a:ext cx="8509000" cy="2202651"/>
+          </a:xfrm>
+        </p:spPr>
+      </p:pic>
     </p:spTree>
     <p:extLst>
       <p:ext uri="{BB962C8B-B14F-4D97-AF65-F5344CB8AC3E}">

</xml_diff>